<commit_message>
Update NTU Ride Pilot presentation file
Replaces the NTU Ride Pilot.pptx file with a new version. The changes may include updated slides, content, or formatting.
</commit_message>
<xml_diff>
--- a/NTU Ride Pilot.pptx
+++ b/NTU Ride Pilot.pptx
@@ -11,9 +11,8 @@
     <p:sldId id="260" r:id="rId5"/>
     <p:sldId id="261" r:id="rId6"/>
     <p:sldId id="262" r:id="rId7"/>
-    <p:sldId id="266" r:id="rId8"/>
-    <p:sldId id="263" r:id="rId9"/>
-    <p:sldId id="264" r:id="rId10"/>
+    <p:sldId id="263" r:id="rId8"/>
+    <p:sldId id="264" r:id="rId9"/>
   </p:sldIdLst>
   <p:sldSz cx="9144000" cy="6858000" type="screen4x3"/>
   <p:notesSz cx="6858000" cy="9144000"/>
@@ -310,7 +309,7 @@
           <a:p>
             <a:fld id="{5BCAD085-E8A6-8845-BD4E-CB4CCA059FC4}" type="datetimeFigureOut">
               <a:rPr lang="en-US" smtClean="0"/>
-              <a:t>7/13/2025</a:t>
+              <a:t>7/14/2025</a:t>
             </a:fld>
             <a:endParaRPr lang="en-US"/>
           </a:p>
@@ -478,7 +477,7 @@
           <a:p>
             <a:fld id="{5BCAD085-E8A6-8845-BD4E-CB4CCA059FC4}" type="datetimeFigureOut">
               <a:rPr lang="en-US" smtClean="0"/>
-              <a:t>7/13/2025</a:t>
+              <a:t>7/14/2025</a:t>
             </a:fld>
             <a:endParaRPr lang="en-US"/>
           </a:p>
@@ -656,7 +655,7 @@
           <a:p>
             <a:fld id="{5BCAD085-E8A6-8845-BD4E-CB4CCA059FC4}" type="datetimeFigureOut">
               <a:rPr lang="en-US" smtClean="0"/>
-              <a:t>7/13/2025</a:t>
+              <a:t>7/14/2025</a:t>
             </a:fld>
             <a:endParaRPr lang="en-US"/>
           </a:p>
@@ -824,7 +823,7 @@
           <a:p>
             <a:fld id="{5BCAD085-E8A6-8845-BD4E-CB4CCA059FC4}" type="datetimeFigureOut">
               <a:rPr lang="en-US" smtClean="0"/>
-              <a:t>7/13/2025</a:t>
+              <a:t>7/14/2025</a:t>
             </a:fld>
             <a:endParaRPr lang="en-US"/>
           </a:p>
@@ -1069,7 +1068,7 @@
           <a:p>
             <a:fld id="{5BCAD085-E8A6-8845-BD4E-CB4CCA059FC4}" type="datetimeFigureOut">
               <a:rPr lang="en-US" smtClean="0"/>
-              <a:t>7/13/2025</a:t>
+              <a:t>7/14/2025</a:t>
             </a:fld>
             <a:endParaRPr lang="en-US"/>
           </a:p>
@@ -1354,7 +1353,7 @@
           <a:p>
             <a:fld id="{5BCAD085-E8A6-8845-BD4E-CB4CCA059FC4}" type="datetimeFigureOut">
               <a:rPr lang="en-US" smtClean="0"/>
-              <a:t>7/13/2025</a:t>
+              <a:t>7/14/2025</a:t>
             </a:fld>
             <a:endParaRPr lang="en-US"/>
           </a:p>
@@ -1773,7 +1772,7 @@
           <a:p>
             <a:fld id="{5BCAD085-E8A6-8845-BD4E-CB4CCA059FC4}" type="datetimeFigureOut">
               <a:rPr lang="en-US" smtClean="0"/>
-              <a:t>7/13/2025</a:t>
+              <a:t>7/14/2025</a:t>
             </a:fld>
             <a:endParaRPr lang="en-US"/>
           </a:p>
@@ -1890,7 +1889,7 @@
           <a:p>
             <a:fld id="{5BCAD085-E8A6-8845-BD4E-CB4CCA059FC4}" type="datetimeFigureOut">
               <a:rPr lang="en-US" smtClean="0"/>
-              <a:t>7/13/2025</a:t>
+              <a:t>7/14/2025</a:t>
             </a:fld>
             <a:endParaRPr lang="en-US"/>
           </a:p>
@@ -1985,7 +1984,7 @@
           <a:p>
             <a:fld id="{5BCAD085-E8A6-8845-BD4E-CB4CCA059FC4}" type="datetimeFigureOut">
               <a:rPr lang="en-US" smtClean="0"/>
-              <a:t>7/13/2025</a:t>
+              <a:t>7/14/2025</a:t>
             </a:fld>
             <a:endParaRPr lang="en-US"/>
           </a:p>
@@ -2260,7 +2259,7 @@
           <a:p>
             <a:fld id="{5BCAD085-E8A6-8845-BD4E-CB4CCA059FC4}" type="datetimeFigureOut">
               <a:rPr lang="en-US" smtClean="0"/>
-              <a:t>7/13/2025</a:t>
+              <a:t>7/14/2025</a:t>
             </a:fld>
             <a:endParaRPr lang="en-US"/>
           </a:p>
@@ -2512,7 +2511,7 @@
           <a:p>
             <a:fld id="{5BCAD085-E8A6-8845-BD4E-CB4CCA059FC4}" type="datetimeFigureOut">
               <a:rPr lang="en-US" smtClean="0"/>
-              <a:t>7/13/2025</a:t>
+              <a:t>7/14/2025</a:t>
             </a:fld>
             <a:endParaRPr lang="en-US"/>
           </a:p>
@@ -2723,7 +2722,7 @@
           <a:p>
             <a:fld id="{5BCAD085-E8A6-8845-BD4E-CB4CCA059FC4}" type="datetimeFigureOut">
               <a:rPr lang="en-US" smtClean="0"/>
-              <a:t>7/13/2025</a:t>
+              <a:t>7/14/2025</a:t>
             </a:fld>
             <a:endParaRPr lang="en-US"/>
           </a:p>
@@ -3114,7 +3113,7 @@
                 <a16:creationId xmlns:a16="http://schemas.microsoft.com/office/drawing/2014/main" id="{943CAA20-3569-4189-9E48-239A229A86CA}"/>
               </a:ext>
               <a:ext uri="{C183D7F6-B498-43B3-948B-1728B52AA6E4}">
-                <adec:decorative xmlns:adec="http://schemas.microsoft.com/office/drawing/2017/decorative" val="1"/>
+                <adec:decorative xmlns="" xmlns:adec="http://schemas.microsoft.com/office/drawing/2017/decorative" val="1"/>
               </a:ext>
             </a:extLst>
           </p:cNvPr>
@@ -3178,8 +3177,8 @@
         </p:nvSpPr>
         <p:spPr>
           <a:xfrm>
-            <a:off x="628650" y="451381"/>
-            <a:ext cx="7884414" cy="4066540"/>
+            <a:off x="628650" y="3312367"/>
+            <a:ext cx="7884414" cy="1205554"/>
           </a:xfrm>
         </p:spPr>
         <p:txBody>
@@ -3196,7 +3195,7 @@
               </a:defRPr>
             </a:pPr>
             <a:r>
-              <a:rPr lang="en-US" sz="5700"/>
+              <a:rPr lang="en-US" sz="5700" dirty="0"/>
               <a:t>NTU Ride Pilot</a:t>
             </a:r>
           </a:p>
@@ -3230,8 +3229,28 @@
               </a:lnSpc>
             </a:pPr>
             <a:r>
-              <a:rPr lang="en-US" sz="2000"/>
-              <a:t>Presented by: Abubakar Nadeem, Imran Ali Niaz, Huzaifa Ahmad</a:t>
+              <a:rPr lang="en-US" sz="2000" dirty="0"/>
+              <a:t>Presented by: </a:t>
+            </a:r>
+            <a:r>
+              <a:rPr lang="en-US" sz="2000" b="1" dirty="0"/>
+              <a:t>Abubakar Nadeem, Imran Ali </a:t>
+            </a:r>
+            <a:r>
+              <a:rPr lang="en-US" sz="2000" b="1" dirty="0" err="1"/>
+              <a:t>Niaz</a:t>
+            </a:r>
+            <a:r>
+              <a:rPr lang="en-US" sz="2000" b="1" dirty="0"/>
+              <a:t>, </a:t>
+            </a:r>
+            <a:r>
+              <a:rPr lang="en-US" sz="2000" b="1" dirty="0" err="1"/>
+              <a:t>Huzaifa</a:t>
+            </a:r>
+            <a:r>
+              <a:rPr lang="en-US" sz="2000" b="1" dirty="0"/>
+              <a:t> Ahmad</a:t>
             </a:r>
           </a:p>
           <a:p>
@@ -3241,9 +3260,34 @@
               </a:lnSpc>
             </a:pPr>
             <a:r>
-              <a:rPr lang="en-US" sz="2000"/>
-              <a:t>Supervised by: Mr. Zahid Javed, Mr. Muhammad Naeem</a:t>
-            </a:r>
+              <a:rPr lang="en-US" sz="2000" dirty="0"/>
+              <a:t>Supervised by: </a:t>
+            </a:r>
+            <a:r>
+              <a:rPr lang="en-US" sz="2000" b="1" dirty="0"/>
+              <a:t>Mr. </a:t>
+            </a:r>
+            <a:r>
+              <a:rPr lang="en-US" sz="2000" b="1" dirty="0" err="1"/>
+              <a:t>Zahid</a:t>
+            </a:r>
+            <a:r>
+              <a:rPr lang="en-US" sz="2000" b="1" dirty="0"/>
+              <a:t> </a:t>
+            </a:r>
+            <a:r>
+              <a:rPr lang="en-US" sz="2000" b="1" dirty="0" err="1"/>
+              <a:t>Javed</a:t>
+            </a:r>
+            <a:r>
+              <a:rPr lang="en-US" sz="2000" b="1" dirty="0"/>
+              <a:t>, Mr. Muhammad </a:t>
+            </a:r>
+            <a:r>
+              <a:rPr lang="en-US" sz="2000" b="1" dirty="0" err="1"/>
+              <a:t>Naeem</a:t>
+            </a:r>
+            <a:endParaRPr lang="en-US" sz="2000" b="1" dirty="0"/>
           </a:p>
           <a:p>
             <a:pPr algn="l">
@@ -3252,8 +3296,12 @@
               </a:lnSpc>
             </a:pPr>
             <a:r>
-              <a:rPr lang="en-US" sz="2000"/>
-              <a:t>Institution: National Textile University, Faisalabad</a:t>
+              <a:rPr lang="en-US" sz="2000" dirty="0"/>
+              <a:t>Institution: </a:t>
+            </a:r>
+            <a:r>
+              <a:rPr lang="en-US" sz="2000" b="1" dirty="0"/>
+              <a:t>National Textile University, Faisalabad</a:t>
             </a:r>
           </a:p>
         </p:txBody>
@@ -3266,7 +3314,7 @@
                 <a16:creationId xmlns:a16="http://schemas.microsoft.com/office/drawing/2014/main" id="{DA542B6D-E775-4832-91DC-2D20F857813A}"/>
               </a:ext>
               <a:ext uri="{C183D7F6-B498-43B3-948B-1728B52AA6E4}">
-                <adec:decorative xmlns:adec="http://schemas.microsoft.com/office/drawing/2017/decorative" val="1"/>
+                <adec:decorative xmlns="" xmlns:adec="http://schemas.microsoft.com/office/drawing/2017/decorative" val="1"/>
               </a:ext>
             </a:extLst>
           </p:cNvPr>
@@ -3534,7 +3582,7 @@
             <a:round/>
             <a:extLst>
               <a:ext uri="{C807C97D-BFC1-408E-A445-0C87EB9F89A2}">
-                <ask:lineSketchStyleProps xmlns:ask="http://schemas.microsoft.com/office/drawing/2018/sketchyshapes" sd="1219033472">
+                <ask:lineSketchStyleProps xmlns="" xmlns:ask="http://schemas.microsoft.com/office/drawing/2018/sketchyshapes" sd="1219033472">
                   <a:prstGeom prst="rect">
                     <a:avLst/>
                   </a:prstGeom>
@@ -3612,7 +3660,7 @@
                 <a16:creationId xmlns:a16="http://schemas.microsoft.com/office/drawing/2014/main" id="{777A147A-9ED8-46B4-8660-1B3C2AA880B5}"/>
               </a:ext>
               <a:ext uri="{C183D7F6-B498-43B3-948B-1728B52AA6E4}">
-                <adec:decorative xmlns:adec="http://schemas.microsoft.com/office/drawing/2017/decorative" val="1"/>
+                <adec:decorative xmlns="" xmlns:adec="http://schemas.microsoft.com/office/drawing/2017/decorative" val="1"/>
               </a:ext>
             </a:extLst>
           </p:cNvPr>
@@ -3708,7 +3756,7 @@
                 <a16:creationId xmlns:a16="http://schemas.microsoft.com/office/drawing/2014/main" id="{5D6C15A0-C087-4593-8414-2B4EC1CDC3DE}"/>
               </a:ext>
               <a:ext uri="{C183D7F6-B498-43B3-948B-1728B52AA6E4}">
-                <adec:decorative xmlns:adec="http://schemas.microsoft.com/office/drawing/2017/decorative" val="1"/>
+                <adec:decorative xmlns="" xmlns:adec="http://schemas.microsoft.com/office/drawing/2017/decorative" val="1"/>
               </a:ext>
             </a:extLst>
           </p:cNvPr>
@@ -4006,7 +4054,7 @@
             <a:round/>
             <a:extLst>
               <a:ext uri="{C807C97D-BFC1-408E-A445-0C87EB9F89A2}">
-                <ask:lineSketchStyleProps xmlns:ask="http://schemas.microsoft.com/office/drawing/2018/sketchyshapes" sd="1219033472">
+                <ask:lineSketchStyleProps xmlns="" xmlns:ask="http://schemas.microsoft.com/office/drawing/2018/sketchyshapes" sd="1219033472">
                   <a:prstGeom prst="rect">
                     <a:avLst/>
                   </a:prstGeom>
@@ -4249,7 +4297,7 @@
                 <a16:creationId xmlns:a16="http://schemas.microsoft.com/office/drawing/2014/main" id="{100EDD19-6802-4EC3-95CE-CFFAB042CFD6}"/>
               </a:ext>
               <a:ext uri="{C183D7F6-B498-43B3-948B-1728B52AA6E4}">
-                <adec:decorative xmlns:adec="http://schemas.microsoft.com/office/drawing/2017/decorative" val="1"/>
+                <adec:decorative xmlns="" xmlns:adec="http://schemas.microsoft.com/office/drawing/2017/decorative" val="1"/>
               </a:ext>
             </a:extLst>
           </p:cNvPr>
@@ -4345,7 +4393,7 @@
                 <a16:creationId xmlns:a16="http://schemas.microsoft.com/office/drawing/2014/main" id="{DB17E863-922E-4C26-BD64-E8FD41D28661}"/>
               </a:ext>
               <a:ext uri="{C183D7F6-B498-43B3-948B-1728B52AA6E4}">
-                <adec:decorative xmlns:adec="http://schemas.microsoft.com/office/drawing/2017/decorative" val="1"/>
+                <adec:decorative xmlns="" xmlns:adec="http://schemas.microsoft.com/office/drawing/2017/decorative" val="1"/>
               </a:ext>
             </a:extLst>
           </p:cNvPr>
@@ -4788,7 +4836,7 @@
             <a:round/>
             <a:extLst>
               <a:ext uri="{C807C97D-BFC1-408E-A445-0C87EB9F89A2}">
-                <ask:lineSketchStyleProps xmlns:ask="http://schemas.microsoft.com/office/drawing/2018/sketchyshapes" sd="1219033472">
+                <ask:lineSketchStyleProps xmlns="" xmlns:ask="http://schemas.microsoft.com/office/drawing/2018/sketchyshapes" sd="1219033472">
                   <a:prstGeom prst="rect">
                     <a:avLst/>
                   </a:prstGeom>
@@ -4851,7 +4899,7 @@
               <a:defRPr sz="1800"/>
             </a:pPr>
             <a:r>
-              <a:rPr lang="en-US" sz="1900"/>
+              <a:rPr lang="en-US" sz="1900" dirty="0"/>
               <a:t>Inefficient transport in educational institutions</a:t>
             </a:r>
           </a:p>
@@ -4860,7 +4908,7 @@
               <a:defRPr sz="1800"/>
             </a:pPr>
             <a:r>
-              <a:rPr lang="en-US" sz="1900"/>
+              <a:rPr lang="en-US" sz="1900" dirty="0"/>
               <a:t>No real-time tracking or monitoring</a:t>
             </a:r>
           </a:p>
@@ -4869,7 +4917,7 @@
               <a:defRPr sz="1800"/>
             </a:pPr>
             <a:r>
-              <a:rPr lang="en-US" sz="1900"/>
+              <a:rPr lang="en-US" sz="1900" dirty="0"/>
               <a:t>Overcrowding and unauthorized access</a:t>
             </a:r>
           </a:p>
@@ -4878,8 +4926,16 @@
               <a:defRPr sz="1800"/>
             </a:pPr>
             <a:r>
-              <a:rPr lang="en-US" sz="1900"/>
-              <a:t>Poor communication between admin, students, parents</a:t>
+              <a:rPr lang="en-US" sz="1900" dirty="0"/>
+              <a:t>Poor communication between </a:t>
+            </a:r>
+            <a:r>
+              <a:rPr lang="en-US" sz="1900" dirty="0" smtClean="0"/>
+              <a:t>administration, </a:t>
+            </a:r>
+            <a:r>
+              <a:rPr lang="en-US" sz="1900" dirty="0"/>
+              <a:t>students, parents</a:t>
             </a:r>
           </a:p>
         </p:txBody>
@@ -4925,7 +4981,7 @@
                 <a16:creationId xmlns:a16="http://schemas.microsoft.com/office/drawing/2014/main" id="{100EDD19-6802-4EC3-95CE-CFFAB042CFD6}"/>
               </a:ext>
               <a:ext uri="{C183D7F6-B498-43B3-948B-1728B52AA6E4}">
-                <adec:decorative xmlns:adec="http://schemas.microsoft.com/office/drawing/2017/decorative" val="1"/>
+                <adec:decorative xmlns="" xmlns:adec="http://schemas.microsoft.com/office/drawing/2017/decorative" val="1"/>
               </a:ext>
             </a:extLst>
           </p:cNvPr>
@@ -5021,7 +5077,7 @@
                 <a16:creationId xmlns:a16="http://schemas.microsoft.com/office/drawing/2014/main" id="{DB17E863-922E-4C26-BD64-E8FD41D28661}"/>
               </a:ext>
               <a:ext uri="{C183D7F6-B498-43B3-948B-1728B52AA6E4}">
-                <adec:decorative xmlns:adec="http://schemas.microsoft.com/office/drawing/2017/decorative" val="1"/>
+                <adec:decorative xmlns="" xmlns:adec="http://schemas.microsoft.com/office/drawing/2017/decorative" val="1"/>
               </a:ext>
             </a:extLst>
           </p:cNvPr>
@@ -5464,7 +5520,7 @@
             <a:round/>
             <a:extLst>
               <a:ext uri="{C807C97D-BFC1-408E-A445-0C87EB9F89A2}">
-                <ask:lineSketchStyleProps xmlns:ask="http://schemas.microsoft.com/office/drawing/2018/sketchyshapes" sd="1219033472">
+                <ask:lineSketchStyleProps xmlns="" xmlns:ask="http://schemas.microsoft.com/office/drawing/2018/sketchyshapes" sd="1219033472">
                   <a:prstGeom prst="rect">
                     <a:avLst/>
                   </a:prstGeom>
@@ -5527,7 +5583,7 @@
               <a:defRPr sz="1800"/>
             </a:pPr>
             <a:r>
-              <a:rPr lang="en-US" sz="1900"/>
+              <a:rPr lang="en-US" sz="1900" dirty="0"/>
               <a:t>RFID-based student verification system</a:t>
             </a:r>
           </a:p>
@@ -5536,7 +5592,7 @@
               <a:defRPr sz="1800"/>
             </a:pPr>
             <a:r>
-              <a:rPr lang="en-US" sz="1900"/>
+              <a:rPr lang="en-US" sz="1900" dirty="0"/>
               <a:t>Real-time GPS tracking of buses</a:t>
             </a:r>
           </a:p>
@@ -5545,16 +5601,29 @@
               <a:defRPr sz="1800"/>
             </a:pPr>
             <a:r>
-              <a:rPr lang="en-US" sz="1900"/>
-              <a:t>Mobile &amp; web-based system for all users</a:t>
-            </a:r>
+              <a:rPr lang="en-US" sz="1900" dirty="0"/>
+              <a:t>Mobile &amp; web-based </a:t>
+            </a:r>
+            <a:r>
+              <a:rPr lang="en-US" sz="1900" dirty="0" smtClean="0"/>
+              <a:t>solution </a:t>
+            </a:r>
+            <a:r>
+              <a:rPr lang="en-US" sz="1900" dirty="0"/>
+              <a:t>for all </a:t>
+            </a:r>
+            <a:r>
+              <a:rPr lang="en-US" sz="1900" dirty="0" smtClean="0"/>
+              <a:t>stakeholders</a:t>
+            </a:r>
+            <a:endParaRPr lang="en-US" sz="1900" dirty="0"/>
           </a:p>
           <a:p>
             <a:pPr>
               <a:defRPr sz="1800"/>
             </a:pPr>
             <a:r>
-              <a:rPr lang="en-US" sz="1900"/>
+              <a:rPr lang="en-US" sz="1900" dirty="0"/>
               <a:t>Notification system for delays and emergencies</a:t>
             </a:r>
           </a:p>
@@ -5563,7 +5632,7 @@
               <a:defRPr sz="1800"/>
             </a:pPr>
             <a:r>
-              <a:rPr lang="en-US" sz="1900"/>
+              <a:rPr lang="en-US" sz="1900" dirty="0"/>
               <a:t>Driver &amp; occupancy monitoring</a:t>
             </a:r>
           </a:p>
@@ -5610,7 +5679,7 @@
                 <a16:creationId xmlns:a16="http://schemas.microsoft.com/office/drawing/2014/main" id="{352BEC0E-22F8-46D0-9632-375DB541B06C}"/>
               </a:ext>
               <a:ext uri="{C183D7F6-B498-43B3-948B-1728B52AA6E4}">
-                <adec:decorative xmlns:adec="http://schemas.microsoft.com/office/drawing/2017/decorative" val="1"/>
+                <adec:decorative xmlns="" xmlns:adec="http://schemas.microsoft.com/office/drawing/2017/decorative" val="1"/>
               </a:ext>
             </a:extLst>
           </p:cNvPr>
@@ -5706,7 +5775,7 @@
                 <a16:creationId xmlns:a16="http://schemas.microsoft.com/office/drawing/2014/main" id="{3FCFB1DE-0B7E-48CC-BA90-B2AB0889F9D6}"/>
               </a:ext>
               <a:ext uri="{C183D7F6-B498-43B3-948B-1728B52AA6E4}">
-                <adec:decorative xmlns:adec="http://schemas.microsoft.com/office/drawing/2017/decorative" val="1"/>
+                <adec:decorative xmlns="" xmlns:adec="http://schemas.microsoft.com/office/drawing/2017/decorative" val="1"/>
               </a:ext>
             </a:extLst>
           </p:cNvPr>
@@ -5944,7 +6013,7 @@
             <a:round/>
             <a:extLst>
               <a:ext uri="{C807C97D-BFC1-408E-A445-0C87EB9F89A2}">
-                <ask:lineSketchStyleProps xmlns:ask="http://schemas.microsoft.com/office/drawing/2018/sketchyshapes" sd="2727557108">
+                <ask:lineSketchStyleProps xmlns="" xmlns:ask="http://schemas.microsoft.com/office/drawing/2018/sketchyshapes" sd="2727557108">
                   <a:prstGeom prst="rect">
                     <a:avLst/>
                   </a:prstGeom>
@@ -6003,14 +6072,14 @@
           </a:bodyPr>
           <a:lstStyle/>
           <a:p>
-            <a:endParaRPr lang="en-US" sz="1900"/>
+            <a:endParaRPr lang="en-US" sz="1900" dirty="0"/>
           </a:p>
           <a:p>
             <a:pPr>
               <a:defRPr sz="1800"/>
             </a:pPr>
             <a:r>
-              <a:rPr lang="en-US" sz="1900"/>
+              <a:rPr lang="en-US" sz="1900" dirty="0"/>
               <a:t>RFID Authentication</a:t>
             </a:r>
           </a:p>
@@ -6019,7 +6088,7 @@
               <a:defRPr sz="1800"/>
             </a:pPr>
             <a:r>
-              <a:rPr lang="en-US" sz="1900"/>
+              <a:rPr lang="en-US" sz="1900" dirty="0"/>
               <a:t>Live GPS Tracking</a:t>
             </a:r>
           </a:p>
@@ -6028,7 +6097,7 @@
               <a:defRPr sz="1800"/>
             </a:pPr>
             <a:r>
-              <a:rPr lang="en-US" sz="1900"/>
+              <a:rPr lang="en-US" sz="1900" dirty="0"/>
               <a:t>Mobile App (Student/Driver)</a:t>
             </a:r>
           </a:p>
@@ -6037,7 +6106,7 @@
               <a:defRPr sz="1800"/>
             </a:pPr>
             <a:r>
-              <a:rPr lang="en-US" sz="1900"/>
+              <a:rPr lang="en-US" sz="1900" dirty="0"/>
               <a:t>Web Dashboard (Admin)</a:t>
             </a:r>
           </a:p>
@@ -6046,7 +6115,7 @@
               <a:defRPr sz="1800"/>
             </a:pPr>
             <a:r>
-              <a:rPr lang="en-US" sz="1900"/>
+              <a:rPr lang="en-US" sz="1900" dirty="0"/>
               <a:t>Real-Time Alerts &amp; Notifications</a:t>
             </a:r>
           </a:p>
@@ -6055,7 +6124,7 @@
               <a:defRPr sz="1800"/>
             </a:pPr>
             <a:r>
-              <a:rPr lang="en-US" sz="1900"/>
+              <a:rPr lang="en-US" sz="1900" dirty="0"/>
               <a:t>Route &amp; Ride Management</a:t>
             </a:r>
           </a:p>
@@ -6064,7 +6133,7 @@
               <a:defRPr sz="1800"/>
             </a:pPr>
             <a:r>
-              <a:rPr lang="en-US" sz="1900"/>
+              <a:rPr lang="en-US" sz="1900" dirty="0"/>
               <a:t>Bus Card &amp; Session Management</a:t>
             </a:r>
           </a:p>
@@ -6073,7 +6142,7 @@
               <a:defRPr sz="1800"/>
             </a:pPr>
             <a:r>
-              <a:rPr lang="en-US" sz="1900"/>
+              <a:rPr lang="en-US" sz="1900" dirty="0"/>
               <a:t>Complaint &amp; Announcement Modules</a:t>
             </a:r>
           </a:p>
@@ -6086,7 +6155,7 @@
                 </a:solidFill>
               </a:defRPr>
             </a:pPr>
-            <a:endParaRPr lang="en-US" sz="1900"/>
+            <a:endParaRPr lang="en-US" sz="1900" dirty="0"/>
           </a:p>
           <a:p>
             <a:pPr marL="0" indent="0">
@@ -6097,7 +6166,7 @@
                 </a:solidFill>
               </a:defRPr>
             </a:pPr>
-            <a:endParaRPr lang="en-US" sz="1900"/>
+            <a:endParaRPr lang="en-US" sz="1900" dirty="0"/>
           </a:p>
           <a:p>
             <a:pPr marL="0" indent="0">
@@ -6108,7 +6177,7 @@
                 </a:solidFill>
               </a:defRPr>
             </a:pPr>
-            <a:endParaRPr lang="en-US" sz="1900"/>
+            <a:endParaRPr lang="en-US" sz="1900" dirty="0"/>
           </a:p>
           <a:p>
             <a:pPr marL="0" indent="0">
@@ -6119,7 +6188,7 @@
                 </a:solidFill>
               </a:defRPr>
             </a:pPr>
-            <a:endParaRPr lang="en-US" sz="1900"/>
+            <a:endParaRPr lang="en-US" sz="1900" dirty="0"/>
           </a:p>
           <a:p>
             <a:pPr marL="0" indent="0">
@@ -6130,7 +6199,7 @@
                 </a:solidFill>
               </a:defRPr>
             </a:pPr>
-            <a:endParaRPr lang="en-US" sz="1900"/>
+            <a:endParaRPr lang="en-US" sz="1900" dirty="0"/>
           </a:p>
           <a:p>
             <a:pPr marL="0" indent="0">
@@ -6141,7 +6210,7 @@
                 </a:solidFill>
               </a:defRPr>
             </a:pPr>
-            <a:endParaRPr lang="en-US" sz="1900"/>
+            <a:endParaRPr lang="en-US" sz="1900" dirty="0"/>
           </a:p>
           <a:p>
             <a:pPr marL="0" indent="0">
@@ -6152,7 +6221,7 @@
                 </a:solidFill>
               </a:defRPr>
             </a:pPr>
-            <a:endParaRPr lang="en-US" sz="1900"/>
+            <a:endParaRPr lang="en-US" sz="1900" dirty="0"/>
           </a:p>
           <a:p>
             <a:pPr marL="0" indent="0">
@@ -6163,7 +6232,7 @@
                 </a:solidFill>
               </a:defRPr>
             </a:pPr>
-            <a:endParaRPr lang="en-US" sz="1900"/>
+            <a:endParaRPr lang="en-US" sz="1900" dirty="0"/>
           </a:p>
           <a:p>
             <a:pPr marL="0" indent="0">
@@ -6174,7 +6243,7 @@
                 </a:solidFill>
               </a:defRPr>
             </a:pPr>
-            <a:endParaRPr lang="en-US" sz="1900"/>
+            <a:endParaRPr lang="en-US" sz="1900" dirty="0"/>
           </a:p>
           <a:p>
             <a:pPr marL="0" indent="0">
@@ -6185,7 +6254,7 @@
                 </a:solidFill>
               </a:defRPr>
             </a:pPr>
-            <a:endParaRPr lang="en-US" sz="1900"/>
+            <a:endParaRPr lang="en-US" sz="1900" dirty="0"/>
           </a:p>
           <a:p>
             <a:pPr marL="0" indent="0">
@@ -6196,7 +6265,7 @@
                 </a:solidFill>
               </a:defRPr>
             </a:pPr>
-            <a:endParaRPr lang="en-US" sz="1900"/>
+            <a:endParaRPr lang="en-US" sz="1900" dirty="0"/>
           </a:p>
         </p:txBody>
       </p:sp>
@@ -6301,7 +6370,7 @@
                 <a16:creationId xmlns:a16="http://schemas.microsoft.com/office/drawing/2014/main" id="{100EDD19-6802-4EC3-95CE-CFFAB042CFD6}"/>
               </a:ext>
               <a:ext uri="{C183D7F6-B498-43B3-948B-1728B52AA6E4}">
-                <adec:decorative xmlns:adec="http://schemas.microsoft.com/office/drawing/2017/decorative" val="1"/>
+                <adec:decorative xmlns="" xmlns:adec="http://schemas.microsoft.com/office/drawing/2017/decorative" val="1"/>
               </a:ext>
             </a:extLst>
           </p:cNvPr>
@@ -6397,7 +6466,7 @@
                 <a16:creationId xmlns:a16="http://schemas.microsoft.com/office/drawing/2014/main" id="{DB17E863-922E-4C26-BD64-E8FD41D28661}"/>
               </a:ext>
               <a:ext uri="{C183D7F6-B498-43B3-948B-1728B52AA6E4}">
-                <adec:decorative xmlns:adec="http://schemas.microsoft.com/office/drawing/2017/decorative" val="1"/>
+                <adec:decorative xmlns="" xmlns:adec="http://schemas.microsoft.com/office/drawing/2017/decorative" val="1"/>
               </a:ext>
             </a:extLst>
           </p:cNvPr>
@@ -6840,7 +6909,7 @@
             <a:round/>
             <a:extLst>
               <a:ext uri="{C807C97D-BFC1-408E-A445-0C87EB9F89A2}">
-                <ask:lineSketchStyleProps xmlns:ask="http://schemas.microsoft.com/office/drawing/2018/sketchyshapes" sd="1219033472">
+                <ask:lineSketchStyleProps xmlns="" xmlns:ask="http://schemas.microsoft.com/office/drawing/2018/sketchyshapes" sd="1219033472">
                   <a:prstGeom prst="rect">
                     <a:avLst/>
                   </a:prstGeom>
@@ -6987,104 +7056,6 @@
           <a:chExt cx="0" cy="0"/>
         </a:xfrm>
       </p:grpSpPr>
-      <p:pic>
-        <p:nvPicPr>
-          <p:cNvPr id="2" name="Picture 1"/>
-          <p:cNvPicPr>
-            <a:picLocks noChangeAspect="1"/>
-          </p:cNvPicPr>
-          <p:nvPr/>
-        </p:nvPicPr>
-        <p:blipFill>
-          <a:blip r:embed="rId2">
-            <a:extLst>
-              <a:ext uri="{28A0092B-C50C-407E-A947-70E740481C1C}">
-                <a14:useLocalDpi xmlns:a14="http://schemas.microsoft.com/office/drawing/2010/main" val="0"/>
-              </a:ext>
-            </a:extLst>
-          </a:blip>
-          <a:stretch>
-            <a:fillRect/>
-          </a:stretch>
-        </p:blipFill>
-        <p:spPr>
-          <a:xfrm>
-            <a:off x="482600" y="2010172"/>
-            <a:ext cx="3968749" cy="2837655"/>
-          </a:xfrm>
-          <a:prstGeom prst="rect">
-            <a:avLst/>
-          </a:prstGeom>
-        </p:spPr>
-      </p:pic>
-      <p:pic>
-        <p:nvPicPr>
-          <p:cNvPr id="3" name="Picture 2"/>
-          <p:cNvPicPr>
-            <a:picLocks noChangeAspect="1"/>
-          </p:cNvPicPr>
-          <p:nvPr/>
-        </p:nvPicPr>
-        <p:blipFill>
-          <a:blip r:embed="rId3">
-            <a:extLst>
-              <a:ext uri="{28A0092B-C50C-407E-A947-70E740481C1C}">
-                <a14:useLocalDpi xmlns:a14="http://schemas.microsoft.com/office/drawing/2010/main" val="0"/>
-              </a:ext>
-            </a:extLst>
-          </a:blip>
-          <a:stretch>
-            <a:fillRect/>
-          </a:stretch>
-        </p:blipFill>
-        <p:spPr>
-          <a:xfrm>
-            <a:off x="4692648" y="2054820"/>
-            <a:ext cx="3968751" cy="2748360"/>
-          </a:xfrm>
-          <a:prstGeom prst="rect">
-            <a:avLst/>
-          </a:prstGeom>
-        </p:spPr>
-      </p:pic>
-    </p:spTree>
-    <p:extLst>
-      <p:ext uri="{BB962C8B-B14F-4D97-AF65-F5344CB8AC3E}">
-        <p14:creationId xmlns:p14="http://schemas.microsoft.com/office/powerpoint/2010/main" val="1514276316"/>
-      </p:ext>
-    </p:extLst>
-  </p:cSld>
-  <p:clrMapOvr>
-    <a:masterClrMapping/>
-  </p:clrMapOvr>
-</p:sld>
-</file>
-
-<file path=ppt/slides/slide8.xml><?xml version="1.0" encoding="utf-8"?>
-<p:sld xmlns:a="http://schemas.openxmlformats.org/drawingml/2006/main" xmlns:r="http://schemas.openxmlformats.org/officeDocument/2006/relationships" xmlns:p="http://schemas.openxmlformats.org/presentationml/2006/main">
-  <p:cSld>
-    <p:bg>
-      <p:bgPr>
-        <a:solidFill>
-          <a:schemeClr val="bg1"/>
-        </a:solidFill>
-        <a:effectLst/>
-      </p:bgPr>
-    </p:bg>
-    <p:spTree>
-      <p:nvGrpSpPr>
-        <p:cNvPr id="1" name=""/>
-        <p:cNvGrpSpPr/>
-        <p:nvPr/>
-      </p:nvGrpSpPr>
-      <p:grpSpPr>
-        <a:xfrm>
-          <a:off x="0" y="0"/>
-          <a:ext cx="0" cy="0"/>
-          <a:chOff x="0" y="0"/>
-          <a:chExt cx="0" cy="0"/>
-        </a:xfrm>
-      </p:grpSpPr>
       <p:sp useBgFill="1">
         <p:nvSpPr>
           <p:cNvPr id="8" name="Rectangle 7">
@@ -7093,7 +7064,7 @@
                 <a16:creationId xmlns:a16="http://schemas.microsoft.com/office/drawing/2014/main" id="{100EDD19-6802-4EC3-95CE-CFFAB042CFD6}"/>
               </a:ext>
               <a:ext uri="{C183D7F6-B498-43B3-948B-1728B52AA6E4}">
-                <adec:decorative xmlns:adec="http://schemas.microsoft.com/office/drawing/2017/decorative" val="1"/>
+                <adec:decorative xmlns="" xmlns:adec="http://schemas.microsoft.com/office/drawing/2017/decorative" val="1"/>
               </a:ext>
             </a:extLst>
           </p:cNvPr>
@@ -7189,7 +7160,7 @@
                 <a16:creationId xmlns:a16="http://schemas.microsoft.com/office/drawing/2014/main" id="{DB17E863-922E-4C26-BD64-E8FD41D28661}"/>
               </a:ext>
               <a:ext uri="{C183D7F6-B498-43B3-948B-1728B52AA6E4}">
-                <adec:decorative xmlns:adec="http://schemas.microsoft.com/office/drawing/2017/decorative" val="1"/>
+                <adec:decorative xmlns="" xmlns:adec="http://schemas.microsoft.com/office/drawing/2017/decorative" val="1"/>
               </a:ext>
             </a:extLst>
           </p:cNvPr>
@@ -7632,7 +7603,7 @@
             <a:round/>
             <a:extLst>
               <a:ext uri="{C807C97D-BFC1-408E-A445-0C87EB9F89A2}">
-                <ask:lineSketchStyleProps xmlns:ask="http://schemas.microsoft.com/office/drawing/2018/sketchyshapes" sd="1219033472">
+                <ask:lineSketchStyleProps xmlns="" xmlns:ask="http://schemas.microsoft.com/office/drawing/2018/sketchyshapes" sd="1219033472">
                   <a:prstGeom prst="rect">
                     <a:avLst/>
                   </a:prstGeom>
@@ -7745,7 +7716,7 @@
 </p:sld>
 </file>
 
-<file path=ppt/slides/slide9.xml><?xml version="1.0" encoding="utf-8"?>
+<file path=ppt/slides/slide8.xml><?xml version="1.0" encoding="utf-8"?>
 <p:sld xmlns:a="http://schemas.openxmlformats.org/drawingml/2006/main" xmlns:r="http://schemas.openxmlformats.org/officeDocument/2006/relationships" xmlns:p="http://schemas.openxmlformats.org/presentationml/2006/main">
   <p:cSld>
     <p:bg>
@@ -7778,7 +7749,7 @@
                 <a16:creationId xmlns:a16="http://schemas.microsoft.com/office/drawing/2014/main" id="{100EDD19-6802-4EC3-95CE-CFFAB042CFD6}"/>
               </a:ext>
               <a:ext uri="{C183D7F6-B498-43B3-948B-1728B52AA6E4}">
-                <adec:decorative xmlns:adec="http://schemas.microsoft.com/office/drawing/2017/decorative" val="1"/>
+                <adec:decorative xmlns="" xmlns:adec="http://schemas.microsoft.com/office/drawing/2017/decorative" val="1"/>
               </a:ext>
             </a:extLst>
           </p:cNvPr>
@@ -7874,7 +7845,7 @@
                 <a16:creationId xmlns:a16="http://schemas.microsoft.com/office/drawing/2014/main" id="{DB17E863-922E-4C26-BD64-E8FD41D28661}"/>
               </a:ext>
               <a:ext uri="{C183D7F6-B498-43B3-948B-1728B52AA6E4}">
-                <adec:decorative xmlns:adec="http://schemas.microsoft.com/office/drawing/2017/decorative" val="1"/>
+                <adec:decorative xmlns="" xmlns:adec="http://schemas.microsoft.com/office/drawing/2017/decorative" val="1"/>
               </a:ext>
             </a:extLst>
           </p:cNvPr>
@@ -8317,7 +8288,7 @@
             <a:round/>
             <a:extLst>
               <a:ext uri="{C807C97D-BFC1-408E-A445-0C87EB9F89A2}">
-                <ask:lineSketchStyleProps xmlns:ask="http://schemas.microsoft.com/office/drawing/2018/sketchyshapes" sd="1219033472">
+                <ask:lineSketchStyleProps xmlns="" xmlns:ask="http://schemas.microsoft.com/office/drawing/2018/sketchyshapes" sd="1219033472">
                   <a:prstGeom prst="rect">
                     <a:avLst/>
                   </a:prstGeom>

</xml_diff>